<commit_message>
Update Training / Basics of opencv and structure for SC19 training
</commit_message>
<xml_diff>
--- a/figures/figures.pptx
+++ b/figures/figures.pptx
@@ -6,6 +6,7 @@
   </p:sldMasterIdLst>
   <p:sldIdLst>
     <p:sldId id="256" r:id="rId2"/>
+    <p:sldId id="257" r:id="rId3"/>
   </p:sldIdLst>
   <p:sldSz cx="12192000" cy="6858000"/>
   <p:notesSz cx="6858000" cy="9144000"/>
@@ -104,6 +105,11 @@
       </a:defRPr>
     </a:lvl9pPr>
   </p:defaultTextStyle>
+  <p:extLst>
+    <p:ext uri="{EFAFB233-063F-42B5-8137-9DF3F51BA10A}">
+      <p15:sldGuideLst xmlns:p15="http://schemas.microsoft.com/office/powerpoint/2012/main"/>
+    </p:ext>
+  </p:extLst>
 </p:presentation>
 </file>
 
@@ -254,7 +260,7 @@
           <a:p>
             <a:fld id="{BA1467D7-2E6A-4A59-A316-2641B7B70597}" type="datetimeFigureOut">
               <a:rPr lang="fr-FR" smtClean="0"/>
-              <a:t>24/03/2024</a:t>
+              <a:t>19/08/2024</a:t>
             </a:fld>
             <a:endParaRPr lang="fr-FR"/>
           </a:p>
@@ -452,7 +458,7 @@
           <a:p>
             <a:fld id="{BA1467D7-2E6A-4A59-A316-2641B7B70597}" type="datetimeFigureOut">
               <a:rPr lang="fr-FR" smtClean="0"/>
-              <a:t>24/03/2024</a:t>
+              <a:t>19/08/2024</a:t>
             </a:fld>
             <a:endParaRPr lang="fr-FR"/>
           </a:p>
@@ -660,7 +666,7 @@
           <a:p>
             <a:fld id="{BA1467D7-2E6A-4A59-A316-2641B7B70597}" type="datetimeFigureOut">
               <a:rPr lang="fr-FR" smtClean="0"/>
-              <a:t>24/03/2024</a:t>
+              <a:t>19/08/2024</a:t>
             </a:fld>
             <a:endParaRPr lang="fr-FR"/>
           </a:p>
@@ -858,7 +864,7 @@
           <a:p>
             <a:fld id="{BA1467D7-2E6A-4A59-A316-2641B7B70597}" type="datetimeFigureOut">
               <a:rPr lang="fr-FR" smtClean="0"/>
-              <a:t>24/03/2024</a:t>
+              <a:t>19/08/2024</a:t>
             </a:fld>
             <a:endParaRPr lang="fr-FR"/>
           </a:p>
@@ -1133,7 +1139,7 @@
           <a:p>
             <a:fld id="{BA1467D7-2E6A-4A59-A316-2641B7B70597}" type="datetimeFigureOut">
               <a:rPr lang="fr-FR" smtClean="0"/>
-              <a:t>24/03/2024</a:t>
+              <a:t>19/08/2024</a:t>
             </a:fld>
             <a:endParaRPr lang="fr-FR"/>
           </a:p>
@@ -1398,7 +1404,7 @@
           <a:p>
             <a:fld id="{BA1467D7-2E6A-4A59-A316-2641B7B70597}" type="datetimeFigureOut">
               <a:rPr lang="fr-FR" smtClean="0"/>
-              <a:t>24/03/2024</a:t>
+              <a:t>19/08/2024</a:t>
             </a:fld>
             <a:endParaRPr lang="fr-FR"/>
           </a:p>
@@ -1810,7 +1816,7 @@
           <a:p>
             <a:fld id="{BA1467D7-2E6A-4A59-A316-2641B7B70597}" type="datetimeFigureOut">
               <a:rPr lang="fr-FR" smtClean="0"/>
-              <a:t>24/03/2024</a:t>
+              <a:t>19/08/2024</a:t>
             </a:fld>
             <a:endParaRPr lang="fr-FR"/>
           </a:p>
@@ -1951,7 +1957,7 @@
           <a:p>
             <a:fld id="{BA1467D7-2E6A-4A59-A316-2641B7B70597}" type="datetimeFigureOut">
               <a:rPr lang="fr-FR" smtClean="0"/>
-              <a:t>24/03/2024</a:t>
+              <a:t>19/08/2024</a:t>
             </a:fld>
             <a:endParaRPr lang="fr-FR"/>
           </a:p>
@@ -2064,7 +2070,7 @@
           <a:p>
             <a:fld id="{BA1467D7-2E6A-4A59-A316-2641B7B70597}" type="datetimeFigureOut">
               <a:rPr lang="fr-FR" smtClean="0"/>
-              <a:t>24/03/2024</a:t>
+              <a:t>19/08/2024</a:t>
             </a:fld>
             <a:endParaRPr lang="fr-FR"/>
           </a:p>
@@ -2375,7 +2381,7 @@
           <a:p>
             <a:fld id="{BA1467D7-2E6A-4A59-A316-2641B7B70597}" type="datetimeFigureOut">
               <a:rPr lang="fr-FR" smtClean="0"/>
-              <a:t>24/03/2024</a:t>
+              <a:t>19/08/2024</a:t>
             </a:fld>
             <a:endParaRPr lang="fr-FR"/>
           </a:p>
@@ -2663,7 +2669,7 @@
           <a:p>
             <a:fld id="{BA1467D7-2E6A-4A59-A316-2641B7B70597}" type="datetimeFigureOut">
               <a:rPr lang="fr-FR" smtClean="0"/>
-              <a:t>24/03/2024</a:t>
+              <a:t>19/08/2024</a:t>
             </a:fld>
             <a:endParaRPr lang="fr-FR"/>
           </a:p>
@@ -2904,7 +2910,7 @@
           <a:p>
             <a:fld id="{BA1467D7-2E6A-4A59-A316-2641B7B70597}" type="datetimeFigureOut">
               <a:rPr lang="fr-FR" smtClean="0"/>
-              <a:t>24/03/2024</a:t>
+              <a:t>19/08/2024</a:t>
             </a:fld>
             <a:endParaRPr lang="fr-FR"/>
           </a:p>
@@ -6515,6 +6521,1004 @@
     <p:extLst>
       <p:ext uri="{BB962C8B-B14F-4D97-AF65-F5344CB8AC3E}">
         <p14:creationId xmlns:p14="http://schemas.microsoft.com/office/powerpoint/2010/main" val="4148029315"/>
+      </p:ext>
+    </p:extLst>
+  </p:cSld>
+  <p:clrMapOvr>
+    <a:masterClrMapping/>
+  </p:clrMapOvr>
+</p:sld>
+</file>
+
+<file path=ppt/slides/slide2.xml><?xml version="1.0" encoding="utf-8"?>
+<p:sld xmlns:a="http://schemas.openxmlformats.org/drawingml/2006/main" xmlns:r="http://schemas.openxmlformats.org/officeDocument/2006/relationships" xmlns:p="http://schemas.openxmlformats.org/presentationml/2006/main">
+  <p:cSld>
+    <p:spTree>
+      <p:nvGrpSpPr>
+        <p:cNvPr id="1" name=""/>
+        <p:cNvGrpSpPr/>
+        <p:nvPr/>
+      </p:nvGrpSpPr>
+      <p:grpSpPr>
+        <a:xfrm>
+          <a:off x="0" y="0"/>
+          <a:ext cx="0" cy="0"/>
+          <a:chOff x="0" y="0"/>
+          <a:chExt cx="0" cy="0"/>
+        </a:xfrm>
+      </p:grpSpPr>
+      <p:sp>
+        <p:nvSpPr>
+          <p:cNvPr id="4" name="Rectangle 3">
+            <a:extLst>
+              <a:ext uri="{FF2B5EF4-FFF2-40B4-BE49-F238E27FC236}">
+                <a16:creationId xmlns:a16="http://schemas.microsoft.com/office/drawing/2014/main" id="{37490AE4-3895-9E85-8CCA-ECBFB534FD56}"/>
+              </a:ext>
+            </a:extLst>
+          </p:cNvPr>
+          <p:cNvSpPr/>
+          <p:nvPr/>
+        </p:nvSpPr>
+        <p:spPr>
+          <a:xfrm>
+            <a:off x="1850109" y="2581684"/>
+            <a:ext cx="636607" cy="613458"/>
+          </a:xfrm>
+          <a:prstGeom prst="rect">
+            <a:avLst/>
+          </a:prstGeom>
+          <a:solidFill>
+            <a:schemeClr val="bg1">
+              <a:lumMod val="65000"/>
+            </a:schemeClr>
+          </a:solidFill>
+        </p:spPr>
+        <p:style>
+          <a:lnRef idx="2">
+            <a:schemeClr val="accent1">
+              <a:shade val="15000"/>
+            </a:schemeClr>
+          </a:lnRef>
+          <a:fillRef idx="1">
+            <a:schemeClr val="accent1"/>
+          </a:fillRef>
+          <a:effectRef idx="0">
+            <a:schemeClr val="accent1"/>
+          </a:effectRef>
+          <a:fontRef idx="minor">
+            <a:schemeClr val="lt1"/>
+          </a:fontRef>
+        </p:style>
+        <p:txBody>
+          <a:bodyPr rtlCol="0" anchor="ctr"/>
+          <a:lstStyle/>
+          <a:p>
+            <a:pPr algn="ctr"/>
+            <a:endParaRPr lang="fr-FR"/>
+          </a:p>
+        </p:txBody>
+      </p:sp>
+      <p:sp>
+        <p:nvSpPr>
+          <p:cNvPr id="5" name="Rectangle 4">
+            <a:extLst>
+              <a:ext uri="{FF2B5EF4-FFF2-40B4-BE49-F238E27FC236}">
+                <a16:creationId xmlns:a16="http://schemas.microsoft.com/office/drawing/2014/main" id="{C7DF90F7-D3E5-D731-1AB3-DE1CEAB09FDD}"/>
+              </a:ext>
+            </a:extLst>
+          </p:cNvPr>
+          <p:cNvSpPr/>
+          <p:nvPr/>
+        </p:nvSpPr>
+        <p:spPr>
+          <a:xfrm>
+            <a:off x="2486716" y="2581684"/>
+            <a:ext cx="636607" cy="613458"/>
+          </a:xfrm>
+          <a:prstGeom prst="rect">
+            <a:avLst/>
+          </a:prstGeom>
+          <a:solidFill>
+            <a:schemeClr val="bg1">
+              <a:lumMod val="65000"/>
+            </a:schemeClr>
+          </a:solidFill>
+        </p:spPr>
+        <p:style>
+          <a:lnRef idx="2">
+            <a:schemeClr val="accent1">
+              <a:shade val="15000"/>
+            </a:schemeClr>
+          </a:lnRef>
+          <a:fillRef idx="1">
+            <a:schemeClr val="accent1"/>
+          </a:fillRef>
+          <a:effectRef idx="0">
+            <a:schemeClr val="accent1"/>
+          </a:effectRef>
+          <a:fontRef idx="minor">
+            <a:schemeClr val="lt1"/>
+          </a:fontRef>
+        </p:style>
+        <p:txBody>
+          <a:bodyPr rtlCol="0" anchor="ctr"/>
+          <a:lstStyle/>
+          <a:p>
+            <a:pPr algn="ctr"/>
+            <a:endParaRPr lang="fr-FR"/>
+          </a:p>
+        </p:txBody>
+      </p:sp>
+      <p:sp>
+        <p:nvSpPr>
+          <p:cNvPr id="6" name="Rectangle 5">
+            <a:extLst>
+              <a:ext uri="{FF2B5EF4-FFF2-40B4-BE49-F238E27FC236}">
+                <a16:creationId xmlns:a16="http://schemas.microsoft.com/office/drawing/2014/main" id="{89DC4556-DA88-5A81-74F3-29D6B55F5F76}"/>
+              </a:ext>
+            </a:extLst>
+          </p:cNvPr>
+          <p:cNvSpPr/>
+          <p:nvPr/>
+        </p:nvSpPr>
+        <p:spPr>
+          <a:xfrm>
+            <a:off x="3123323" y="2581684"/>
+            <a:ext cx="636607" cy="613458"/>
+          </a:xfrm>
+          <a:prstGeom prst="rect">
+            <a:avLst/>
+          </a:prstGeom>
+          <a:solidFill>
+            <a:schemeClr val="bg1">
+              <a:lumMod val="85000"/>
+            </a:schemeClr>
+          </a:solidFill>
+        </p:spPr>
+        <p:style>
+          <a:lnRef idx="2">
+            <a:schemeClr val="accent1">
+              <a:shade val="15000"/>
+            </a:schemeClr>
+          </a:lnRef>
+          <a:fillRef idx="1">
+            <a:schemeClr val="accent1"/>
+          </a:fillRef>
+          <a:effectRef idx="0">
+            <a:schemeClr val="accent1"/>
+          </a:effectRef>
+          <a:fontRef idx="minor">
+            <a:schemeClr val="lt1"/>
+          </a:fontRef>
+        </p:style>
+        <p:txBody>
+          <a:bodyPr rtlCol="0" anchor="ctr"/>
+          <a:lstStyle/>
+          <a:p>
+            <a:pPr algn="ctr"/>
+            <a:endParaRPr lang="fr-FR"/>
+          </a:p>
+        </p:txBody>
+      </p:sp>
+      <p:sp>
+        <p:nvSpPr>
+          <p:cNvPr id="7" name="Rectangle 6">
+            <a:extLst>
+              <a:ext uri="{FF2B5EF4-FFF2-40B4-BE49-F238E27FC236}">
+                <a16:creationId xmlns:a16="http://schemas.microsoft.com/office/drawing/2014/main" id="{48C79CB9-896C-03BA-0F02-7669073409E4}"/>
+              </a:ext>
+            </a:extLst>
+          </p:cNvPr>
+          <p:cNvSpPr/>
+          <p:nvPr/>
+        </p:nvSpPr>
+        <p:spPr>
+          <a:xfrm>
+            <a:off x="1850109" y="3195142"/>
+            <a:ext cx="636607" cy="613458"/>
+          </a:xfrm>
+          <a:prstGeom prst="rect">
+            <a:avLst/>
+          </a:prstGeom>
+          <a:solidFill>
+            <a:schemeClr val="bg1">
+              <a:lumMod val="85000"/>
+            </a:schemeClr>
+          </a:solidFill>
+        </p:spPr>
+        <p:style>
+          <a:lnRef idx="2">
+            <a:schemeClr val="accent1">
+              <a:shade val="15000"/>
+            </a:schemeClr>
+          </a:lnRef>
+          <a:fillRef idx="1">
+            <a:schemeClr val="accent1"/>
+          </a:fillRef>
+          <a:effectRef idx="0">
+            <a:schemeClr val="accent1"/>
+          </a:effectRef>
+          <a:fontRef idx="minor">
+            <a:schemeClr val="lt1"/>
+          </a:fontRef>
+        </p:style>
+        <p:txBody>
+          <a:bodyPr rtlCol="0" anchor="ctr"/>
+          <a:lstStyle/>
+          <a:p>
+            <a:pPr algn="ctr"/>
+            <a:endParaRPr lang="fr-FR"/>
+          </a:p>
+        </p:txBody>
+      </p:sp>
+      <p:sp>
+        <p:nvSpPr>
+          <p:cNvPr id="8" name="Rectangle 7">
+            <a:extLst>
+              <a:ext uri="{FF2B5EF4-FFF2-40B4-BE49-F238E27FC236}">
+                <a16:creationId xmlns:a16="http://schemas.microsoft.com/office/drawing/2014/main" id="{B7484E6C-9F17-3352-D3EC-41F747701EB0}"/>
+              </a:ext>
+            </a:extLst>
+          </p:cNvPr>
+          <p:cNvSpPr/>
+          <p:nvPr/>
+        </p:nvSpPr>
+        <p:spPr>
+          <a:xfrm>
+            <a:off x="2486716" y="3195142"/>
+            <a:ext cx="636607" cy="613458"/>
+          </a:xfrm>
+          <a:prstGeom prst="rect">
+            <a:avLst/>
+          </a:prstGeom>
+          <a:solidFill>
+            <a:schemeClr val="bg1">
+              <a:lumMod val="85000"/>
+            </a:schemeClr>
+          </a:solidFill>
+        </p:spPr>
+        <p:style>
+          <a:lnRef idx="2">
+            <a:schemeClr val="accent1">
+              <a:shade val="15000"/>
+            </a:schemeClr>
+          </a:lnRef>
+          <a:fillRef idx="1">
+            <a:schemeClr val="accent1"/>
+          </a:fillRef>
+          <a:effectRef idx="0">
+            <a:schemeClr val="accent1"/>
+          </a:effectRef>
+          <a:fontRef idx="minor">
+            <a:schemeClr val="lt1"/>
+          </a:fontRef>
+        </p:style>
+        <p:txBody>
+          <a:bodyPr rtlCol="0" anchor="ctr"/>
+          <a:lstStyle/>
+          <a:p>
+            <a:pPr algn="ctr"/>
+            <a:endParaRPr lang="fr-FR"/>
+          </a:p>
+        </p:txBody>
+      </p:sp>
+      <p:sp>
+        <p:nvSpPr>
+          <p:cNvPr id="10" name="Rectangle 9">
+            <a:extLst>
+              <a:ext uri="{FF2B5EF4-FFF2-40B4-BE49-F238E27FC236}">
+                <a16:creationId xmlns:a16="http://schemas.microsoft.com/office/drawing/2014/main" id="{908D22A2-2355-AFD1-4757-396292F0FDE1}"/>
+              </a:ext>
+            </a:extLst>
+          </p:cNvPr>
+          <p:cNvSpPr/>
+          <p:nvPr/>
+        </p:nvSpPr>
+        <p:spPr>
+          <a:xfrm>
+            <a:off x="2486715" y="3808600"/>
+            <a:ext cx="636607" cy="613458"/>
+          </a:xfrm>
+          <a:prstGeom prst="rect">
+            <a:avLst/>
+          </a:prstGeom>
+          <a:solidFill>
+            <a:schemeClr val="bg1">
+              <a:lumMod val="65000"/>
+            </a:schemeClr>
+          </a:solidFill>
+        </p:spPr>
+        <p:style>
+          <a:lnRef idx="2">
+            <a:schemeClr val="accent1">
+              <a:shade val="15000"/>
+            </a:schemeClr>
+          </a:lnRef>
+          <a:fillRef idx="1">
+            <a:schemeClr val="accent1"/>
+          </a:fillRef>
+          <a:effectRef idx="0">
+            <a:schemeClr val="accent1"/>
+          </a:effectRef>
+          <a:fontRef idx="minor">
+            <a:schemeClr val="lt1"/>
+          </a:fontRef>
+        </p:style>
+        <p:txBody>
+          <a:bodyPr rtlCol="0" anchor="ctr"/>
+          <a:lstStyle/>
+          <a:p>
+            <a:pPr algn="ctr"/>
+            <a:endParaRPr lang="fr-FR"/>
+          </a:p>
+        </p:txBody>
+      </p:sp>
+      <p:sp>
+        <p:nvSpPr>
+          <p:cNvPr id="11" name="Rectangle 10">
+            <a:extLst>
+              <a:ext uri="{FF2B5EF4-FFF2-40B4-BE49-F238E27FC236}">
+                <a16:creationId xmlns:a16="http://schemas.microsoft.com/office/drawing/2014/main" id="{4FB2FC54-CEDB-F106-B164-FFE6C075F551}"/>
+              </a:ext>
+            </a:extLst>
+          </p:cNvPr>
+          <p:cNvSpPr/>
+          <p:nvPr/>
+        </p:nvSpPr>
+        <p:spPr>
+          <a:xfrm>
+            <a:off x="1850109" y="3808600"/>
+            <a:ext cx="636607" cy="613458"/>
+          </a:xfrm>
+          <a:prstGeom prst="rect">
+            <a:avLst/>
+          </a:prstGeom>
+          <a:solidFill>
+            <a:schemeClr val="bg1">
+              <a:lumMod val="65000"/>
+            </a:schemeClr>
+          </a:solidFill>
+        </p:spPr>
+        <p:style>
+          <a:lnRef idx="2">
+            <a:schemeClr val="accent1">
+              <a:shade val="15000"/>
+            </a:schemeClr>
+          </a:lnRef>
+          <a:fillRef idx="1">
+            <a:schemeClr val="accent1"/>
+          </a:fillRef>
+          <a:effectRef idx="0">
+            <a:schemeClr val="accent1"/>
+          </a:effectRef>
+          <a:fontRef idx="minor">
+            <a:schemeClr val="lt1"/>
+          </a:fontRef>
+        </p:style>
+        <p:txBody>
+          <a:bodyPr rtlCol="0" anchor="ctr"/>
+          <a:lstStyle/>
+          <a:p>
+            <a:pPr algn="ctr"/>
+            <a:endParaRPr lang="fr-FR"/>
+          </a:p>
+        </p:txBody>
+      </p:sp>
+      <p:sp>
+        <p:nvSpPr>
+          <p:cNvPr id="12" name="Rectangle 11">
+            <a:extLst>
+              <a:ext uri="{FF2B5EF4-FFF2-40B4-BE49-F238E27FC236}">
+                <a16:creationId xmlns:a16="http://schemas.microsoft.com/office/drawing/2014/main" id="{F43B2E10-B0AE-3B03-0522-D2FDBE333D47}"/>
+              </a:ext>
+            </a:extLst>
+          </p:cNvPr>
+          <p:cNvSpPr/>
+          <p:nvPr/>
+        </p:nvSpPr>
+        <p:spPr>
+          <a:xfrm>
+            <a:off x="3123322" y="3808600"/>
+            <a:ext cx="636607" cy="613458"/>
+          </a:xfrm>
+          <a:prstGeom prst="rect">
+            <a:avLst/>
+          </a:prstGeom>
+          <a:solidFill>
+            <a:schemeClr val="bg1">
+              <a:lumMod val="85000"/>
+            </a:schemeClr>
+          </a:solidFill>
+        </p:spPr>
+        <p:style>
+          <a:lnRef idx="2">
+            <a:schemeClr val="accent1">
+              <a:shade val="15000"/>
+            </a:schemeClr>
+          </a:lnRef>
+          <a:fillRef idx="1">
+            <a:schemeClr val="accent1"/>
+          </a:fillRef>
+          <a:effectRef idx="0">
+            <a:schemeClr val="accent1"/>
+          </a:effectRef>
+          <a:fontRef idx="minor">
+            <a:schemeClr val="lt1"/>
+          </a:fontRef>
+        </p:style>
+        <p:txBody>
+          <a:bodyPr rtlCol="0" anchor="ctr"/>
+          <a:lstStyle/>
+          <a:p>
+            <a:pPr algn="ctr"/>
+            <a:endParaRPr lang="fr-FR"/>
+          </a:p>
+        </p:txBody>
+      </p:sp>
+      <p:sp>
+        <p:nvSpPr>
+          <p:cNvPr id="13" name="Rectangle 12">
+            <a:extLst>
+              <a:ext uri="{FF2B5EF4-FFF2-40B4-BE49-F238E27FC236}">
+                <a16:creationId xmlns:a16="http://schemas.microsoft.com/office/drawing/2014/main" id="{1087A9A3-4E67-9DA1-C403-2098DD354471}"/>
+              </a:ext>
+            </a:extLst>
+          </p:cNvPr>
+          <p:cNvSpPr/>
+          <p:nvPr/>
+        </p:nvSpPr>
+        <p:spPr>
+          <a:xfrm>
+            <a:off x="3759928" y="2581684"/>
+            <a:ext cx="636607" cy="613458"/>
+          </a:xfrm>
+          <a:prstGeom prst="rect">
+            <a:avLst/>
+          </a:prstGeom>
+          <a:solidFill>
+            <a:schemeClr val="bg1">
+              <a:lumMod val="65000"/>
+            </a:schemeClr>
+          </a:solidFill>
+        </p:spPr>
+        <p:style>
+          <a:lnRef idx="2">
+            <a:schemeClr val="accent1">
+              <a:shade val="15000"/>
+            </a:schemeClr>
+          </a:lnRef>
+          <a:fillRef idx="1">
+            <a:schemeClr val="accent1"/>
+          </a:fillRef>
+          <a:effectRef idx="0">
+            <a:schemeClr val="accent1"/>
+          </a:effectRef>
+          <a:fontRef idx="minor">
+            <a:schemeClr val="lt1"/>
+          </a:fontRef>
+        </p:style>
+        <p:txBody>
+          <a:bodyPr rtlCol="0" anchor="ctr"/>
+          <a:lstStyle/>
+          <a:p>
+            <a:pPr algn="ctr"/>
+            <a:endParaRPr lang="fr-FR"/>
+          </a:p>
+        </p:txBody>
+      </p:sp>
+      <p:sp>
+        <p:nvSpPr>
+          <p:cNvPr id="14" name="Rectangle 13">
+            <a:extLst>
+              <a:ext uri="{FF2B5EF4-FFF2-40B4-BE49-F238E27FC236}">
+                <a16:creationId xmlns:a16="http://schemas.microsoft.com/office/drawing/2014/main" id="{785BC53D-CBBC-69A2-6B2B-BA8716859CA0}"/>
+              </a:ext>
+            </a:extLst>
+          </p:cNvPr>
+          <p:cNvSpPr/>
+          <p:nvPr/>
+        </p:nvSpPr>
+        <p:spPr>
+          <a:xfrm>
+            <a:off x="3759927" y="3195142"/>
+            <a:ext cx="636607" cy="613458"/>
+          </a:xfrm>
+          <a:prstGeom prst="rect">
+            <a:avLst/>
+          </a:prstGeom>
+          <a:solidFill>
+            <a:schemeClr val="bg1">
+              <a:lumMod val="85000"/>
+            </a:schemeClr>
+          </a:solidFill>
+        </p:spPr>
+        <p:style>
+          <a:lnRef idx="2">
+            <a:schemeClr val="accent1">
+              <a:shade val="15000"/>
+            </a:schemeClr>
+          </a:lnRef>
+          <a:fillRef idx="1">
+            <a:schemeClr val="accent1"/>
+          </a:fillRef>
+          <a:effectRef idx="0">
+            <a:schemeClr val="accent1"/>
+          </a:effectRef>
+          <a:fontRef idx="minor">
+            <a:schemeClr val="lt1"/>
+          </a:fontRef>
+        </p:style>
+        <p:txBody>
+          <a:bodyPr rtlCol="0" anchor="ctr"/>
+          <a:lstStyle/>
+          <a:p>
+            <a:pPr algn="ctr"/>
+            <a:endParaRPr lang="fr-FR"/>
+          </a:p>
+        </p:txBody>
+      </p:sp>
+      <p:sp>
+        <p:nvSpPr>
+          <p:cNvPr id="15" name="Rectangle 14">
+            <a:extLst>
+              <a:ext uri="{FF2B5EF4-FFF2-40B4-BE49-F238E27FC236}">
+                <a16:creationId xmlns:a16="http://schemas.microsoft.com/office/drawing/2014/main" id="{41CA7577-3AF3-6BB1-76AD-9A04E368CFF6}"/>
+              </a:ext>
+            </a:extLst>
+          </p:cNvPr>
+          <p:cNvSpPr/>
+          <p:nvPr/>
+        </p:nvSpPr>
+        <p:spPr>
+          <a:xfrm>
+            <a:off x="3759927" y="3808600"/>
+            <a:ext cx="636607" cy="613458"/>
+          </a:xfrm>
+          <a:prstGeom prst="rect">
+            <a:avLst/>
+          </a:prstGeom>
+          <a:solidFill>
+            <a:schemeClr val="bg1">
+              <a:lumMod val="65000"/>
+            </a:schemeClr>
+          </a:solidFill>
+        </p:spPr>
+        <p:style>
+          <a:lnRef idx="2">
+            <a:schemeClr val="accent1">
+              <a:shade val="15000"/>
+            </a:schemeClr>
+          </a:lnRef>
+          <a:fillRef idx="1">
+            <a:schemeClr val="accent1"/>
+          </a:fillRef>
+          <a:effectRef idx="0">
+            <a:schemeClr val="accent1"/>
+          </a:effectRef>
+          <a:fontRef idx="minor">
+            <a:schemeClr val="lt1"/>
+          </a:fontRef>
+        </p:style>
+        <p:txBody>
+          <a:bodyPr rtlCol="0" anchor="ctr"/>
+          <a:lstStyle/>
+          <a:p>
+            <a:pPr algn="ctr"/>
+            <a:endParaRPr lang="fr-FR"/>
+          </a:p>
+        </p:txBody>
+      </p:sp>
+      <p:sp>
+        <p:nvSpPr>
+          <p:cNvPr id="16" name="ZoneTexte 15">
+            <a:extLst>
+              <a:ext uri="{FF2B5EF4-FFF2-40B4-BE49-F238E27FC236}">
+                <a16:creationId xmlns:a16="http://schemas.microsoft.com/office/drawing/2014/main" id="{433C8093-094D-B109-0695-C9667A6E5258}"/>
+              </a:ext>
+            </a:extLst>
+          </p:cNvPr>
+          <p:cNvSpPr txBox="1"/>
+          <p:nvPr/>
+        </p:nvSpPr>
+        <p:spPr>
+          <a:xfrm>
+            <a:off x="2014363" y="2212352"/>
+            <a:ext cx="308098" cy="369332"/>
+          </a:xfrm>
+          <a:prstGeom prst="rect">
+            <a:avLst/>
+          </a:prstGeom>
+          <a:noFill/>
+        </p:spPr>
+        <p:txBody>
+          <a:bodyPr wrap="none" rtlCol="0">
+            <a:spAutoFit/>
+          </a:bodyPr>
+          <a:lstStyle/>
+          <a:p>
+            <a:r>
+              <a:rPr lang="fr-FR" dirty="0"/>
+              <a:t>1</a:t>
+            </a:r>
+          </a:p>
+        </p:txBody>
+      </p:sp>
+      <p:sp>
+        <p:nvSpPr>
+          <p:cNvPr id="17" name="ZoneTexte 16">
+            <a:extLst>
+              <a:ext uri="{FF2B5EF4-FFF2-40B4-BE49-F238E27FC236}">
+                <a16:creationId xmlns:a16="http://schemas.microsoft.com/office/drawing/2014/main" id="{4856D0C8-447D-A780-4639-22E7BB9F7D2B}"/>
+              </a:ext>
+            </a:extLst>
+          </p:cNvPr>
+          <p:cNvSpPr txBox="1"/>
+          <p:nvPr/>
+        </p:nvSpPr>
+        <p:spPr>
+          <a:xfrm>
+            <a:off x="2650969" y="2212352"/>
+            <a:ext cx="308098" cy="369332"/>
+          </a:xfrm>
+          <a:prstGeom prst="rect">
+            <a:avLst/>
+          </a:prstGeom>
+          <a:noFill/>
+        </p:spPr>
+        <p:txBody>
+          <a:bodyPr wrap="none" rtlCol="0">
+            <a:spAutoFit/>
+          </a:bodyPr>
+          <a:lstStyle/>
+          <a:p>
+            <a:r>
+              <a:rPr lang="fr-FR" dirty="0"/>
+              <a:t>2</a:t>
+            </a:r>
+          </a:p>
+        </p:txBody>
+      </p:sp>
+      <p:sp>
+        <p:nvSpPr>
+          <p:cNvPr id="18" name="ZoneTexte 17">
+            <a:extLst>
+              <a:ext uri="{FF2B5EF4-FFF2-40B4-BE49-F238E27FC236}">
+                <a16:creationId xmlns:a16="http://schemas.microsoft.com/office/drawing/2014/main" id="{BFA5EAD3-8E6A-C5A0-85E8-E6F557876170}"/>
+              </a:ext>
+            </a:extLst>
+          </p:cNvPr>
+          <p:cNvSpPr txBox="1"/>
+          <p:nvPr/>
+        </p:nvSpPr>
+        <p:spPr>
+          <a:xfrm>
+            <a:off x="3287574" y="2212352"/>
+            <a:ext cx="308098" cy="369332"/>
+          </a:xfrm>
+          <a:prstGeom prst="rect">
+            <a:avLst/>
+          </a:prstGeom>
+          <a:noFill/>
+        </p:spPr>
+        <p:txBody>
+          <a:bodyPr wrap="none" rtlCol="0">
+            <a:spAutoFit/>
+          </a:bodyPr>
+          <a:lstStyle/>
+          <a:p>
+            <a:r>
+              <a:rPr lang="fr-FR" dirty="0"/>
+              <a:t>3</a:t>
+            </a:r>
+          </a:p>
+        </p:txBody>
+      </p:sp>
+      <p:sp>
+        <p:nvSpPr>
+          <p:cNvPr id="19" name="ZoneTexte 18">
+            <a:extLst>
+              <a:ext uri="{FF2B5EF4-FFF2-40B4-BE49-F238E27FC236}">
+                <a16:creationId xmlns:a16="http://schemas.microsoft.com/office/drawing/2014/main" id="{77B34452-57AE-356B-1086-9A7D37D81980}"/>
+              </a:ext>
+            </a:extLst>
+          </p:cNvPr>
+          <p:cNvSpPr txBox="1"/>
+          <p:nvPr/>
+        </p:nvSpPr>
+        <p:spPr>
+          <a:xfrm>
+            <a:off x="3920597" y="2212352"/>
+            <a:ext cx="308098" cy="369332"/>
+          </a:xfrm>
+          <a:prstGeom prst="rect">
+            <a:avLst/>
+          </a:prstGeom>
+          <a:noFill/>
+        </p:spPr>
+        <p:txBody>
+          <a:bodyPr wrap="none" rtlCol="0">
+            <a:spAutoFit/>
+          </a:bodyPr>
+          <a:lstStyle/>
+          <a:p>
+            <a:r>
+              <a:rPr lang="fr-FR" dirty="0"/>
+              <a:t>4</a:t>
+            </a:r>
+          </a:p>
+        </p:txBody>
+      </p:sp>
+      <p:sp>
+        <p:nvSpPr>
+          <p:cNvPr id="20" name="ZoneTexte 19">
+            <a:extLst>
+              <a:ext uri="{FF2B5EF4-FFF2-40B4-BE49-F238E27FC236}">
+                <a16:creationId xmlns:a16="http://schemas.microsoft.com/office/drawing/2014/main" id="{CA9069A0-ED8B-64B0-2C0D-C6AFDDEB0C44}"/>
+              </a:ext>
+            </a:extLst>
+          </p:cNvPr>
+          <p:cNvSpPr txBox="1"/>
+          <p:nvPr/>
+        </p:nvSpPr>
+        <p:spPr>
+          <a:xfrm>
+            <a:off x="1459883" y="2703747"/>
+            <a:ext cx="308098" cy="369332"/>
+          </a:xfrm>
+          <a:prstGeom prst="rect">
+            <a:avLst/>
+          </a:prstGeom>
+          <a:noFill/>
+        </p:spPr>
+        <p:txBody>
+          <a:bodyPr wrap="none" rtlCol="0">
+            <a:spAutoFit/>
+          </a:bodyPr>
+          <a:lstStyle/>
+          <a:p>
+            <a:r>
+              <a:rPr lang="fr-FR" dirty="0"/>
+              <a:t>1</a:t>
+            </a:r>
+          </a:p>
+        </p:txBody>
+      </p:sp>
+      <p:sp>
+        <p:nvSpPr>
+          <p:cNvPr id="21" name="ZoneTexte 20">
+            <a:extLst>
+              <a:ext uri="{FF2B5EF4-FFF2-40B4-BE49-F238E27FC236}">
+                <a16:creationId xmlns:a16="http://schemas.microsoft.com/office/drawing/2014/main" id="{23DE6382-6629-EED4-4555-6A0E21E41954}"/>
+              </a:ext>
+            </a:extLst>
+          </p:cNvPr>
+          <p:cNvSpPr txBox="1"/>
+          <p:nvPr/>
+        </p:nvSpPr>
+        <p:spPr>
+          <a:xfrm>
+            <a:off x="1461254" y="3317205"/>
+            <a:ext cx="308098" cy="369332"/>
+          </a:xfrm>
+          <a:prstGeom prst="rect">
+            <a:avLst/>
+          </a:prstGeom>
+          <a:noFill/>
+        </p:spPr>
+        <p:txBody>
+          <a:bodyPr wrap="none" rtlCol="0">
+            <a:spAutoFit/>
+          </a:bodyPr>
+          <a:lstStyle/>
+          <a:p>
+            <a:r>
+              <a:rPr lang="fr-FR" dirty="0"/>
+              <a:t>2</a:t>
+            </a:r>
+          </a:p>
+        </p:txBody>
+      </p:sp>
+      <p:sp>
+        <p:nvSpPr>
+          <p:cNvPr id="23" name="ZoneTexte 22">
+            <a:extLst>
+              <a:ext uri="{FF2B5EF4-FFF2-40B4-BE49-F238E27FC236}">
+                <a16:creationId xmlns:a16="http://schemas.microsoft.com/office/drawing/2014/main" id="{44150E2B-6A76-9B7E-86DA-5A52C6AD19DB}"/>
+              </a:ext>
+            </a:extLst>
+          </p:cNvPr>
+          <p:cNvSpPr txBox="1"/>
+          <p:nvPr/>
+        </p:nvSpPr>
+        <p:spPr>
+          <a:xfrm>
+            <a:off x="1441828" y="3930663"/>
+            <a:ext cx="308098" cy="369332"/>
+          </a:xfrm>
+          <a:prstGeom prst="rect">
+            <a:avLst/>
+          </a:prstGeom>
+          <a:noFill/>
+        </p:spPr>
+        <p:txBody>
+          <a:bodyPr wrap="none" rtlCol="0">
+            <a:spAutoFit/>
+          </a:bodyPr>
+          <a:lstStyle/>
+          <a:p>
+            <a:r>
+              <a:rPr lang="fr-FR" dirty="0"/>
+              <a:t>3</a:t>
+            </a:r>
+          </a:p>
+        </p:txBody>
+      </p:sp>
+      <p:sp>
+        <p:nvSpPr>
+          <p:cNvPr id="9" name="Rectangle 8">
+            <a:extLst>
+              <a:ext uri="{FF2B5EF4-FFF2-40B4-BE49-F238E27FC236}">
+                <a16:creationId xmlns:a16="http://schemas.microsoft.com/office/drawing/2014/main" id="{31FDE613-E9F7-F41F-0FD9-9C28770D3B8C}"/>
+              </a:ext>
+            </a:extLst>
+          </p:cNvPr>
+          <p:cNvSpPr/>
+          <p:nvPr/>
+        </p:nvSpPr>
+        <p:spPr>
+          <a:xfrm>
+            <a:off x="3123322" y="3195142"/>
+            <a:ext cx="636607" cy="613458"/>
+          </a:xfrm>
+          <a:prstGeom prst="rect">
+            <a:avLst/>
+          </a:prstGeom>
+          <a:solidFill>
+            <a:schemeClr val="bg1"/>
+          </a:solidFill>
+          <a:ln w="76200">
+            <a:solidFill>
+              <a:schemeClr val="tx1">
+                <a:lumMod val="85000"/>
+                <a:lumOff val="15000"/>
+              </a:schemeClr>
+            </a:solidFill>
+          </a:ln>
+        </p:spPr>
+        <p:style>
+          <a:lnRef idx="2">
+            <a:schemeClr val="accent1">
+              <a:shade val="15000"/>
+            </a:schemeClr>
+          </a:lnRef>
+          <a:fillRef idx="1">
+            <a:schemeClr val="accent1"/>
+          </a:fillRef>
+          <a:effectRef idx="0">
+            <a:schemeClr val="accent1"/>
+          </a:effectRef>
+          <a:fontRef idx="minor">
+            <a:schemeClr val="lt1"/>
+          </a:fontRef>
+        </p:style>
+        <p:txBody>
+          <a:bodyPr rtlCol="0" anchor="ctr"/>
+          <a:lstStyle/>
+          <a:p>
+            <a:pPr algn="ctr"/>
+            <a:endParaRPr lang="fr-FR"/>
+          </a:p>
+        </p:txBody>
+      </p:sp>
+      <p:sp>
+        <p:nvSpPr>
+          <p:cNvPr id="229" name="ZoneTexte 228">
+            <a:extLst>
+              <a:ext uri="{FF2B5EF4-FFF2-40B4-BE49-F238E27FC236}">
+                <a16:creationId xmlns:a16="http://schemas.microsoft.com/office/drawing/2014/main" id="{CDF08BE9-BEC6-F424-F063-6BF6035CA374}"/>
+              </a:ext>
+            </a:extLst>
+          </p:cNvPr>
+          <p:cNvSpPr txBox="1"/>
+          <p:nvPr/>
+        </p:nvSpPr>
+        <p:spPr>
+          <a:xfrm>
+            <a:off x="618019" y="438284"/>
+            <a:ext cx="2249334" cy="369332"/>
+          </a:xfrm>
+          <a:prstGeom prst="rect">
+            <a:avLst/>
+          </a:prstGeom>
+          <a:noFill/>
+        </p:spPr>
+        <p:txBody>
+          <a:bodyPr wrap="none" rtlCol="0">
+            <a:spAutoFit/>
+          </a:bodyPr>
+          <a:lstStyle/>
+          <a:p>
+            <a:r>
+              <a:rPr lang="fr-FR" dirty="0"/>
+              <a:t>Convolution (TO DO)</a:t>
+            </a:r>
+          </a:p>
+        </p:txBody>
+      </p:sp>
+      <p:sp>
+        <p:nvSpPr>
+          <p:cNvPr id="230" name="ZoneTexte 229">
+            <a:extLst>
+              <a:ext uri="{FF2B5EF4-FFF2-40B4-BE49-F238E27FC236}">
+                <a16:creationId xmlns:a16="http://schemas.microsoft.com/office/drawing/2014/main" id="{636EE065-EEC6-4B1A-6618-D9640AE213D3}"/>
+              </a:ext>
+            </a:extLst>
+          </p:cNvPr>
+          <p:cNvSpPr txBox="1"/>
+          <p:nvPr/>
+        </p:nvSpPr>
+        <p:spPr>
+          <a:xfrm>
+            <a:off x="2806367" y="1859457"/>
+            <a:ext cx="793807" cy="276999"/>
+          </a:xfrm>
+          <a:prstGeom prst="rect">
+            <a:avLst/>
+          </a:prstGeom>
+          <a:noFill/>
+        </p:spPr>
+        <p:txBody>
+          <a:bodyPr wrap="none" rtlCol="0">
+            <a:spAutoFit/>
+          </a:bodyPr>
+          <a:lstStyle/>
+          <a:p>
+            <a:r>
+              <a:rPr lang="fr-FR" sz="1200" dirty="0"/>
+              <a:t>Columns</a:t>
+            </a:r>
+          </a:p>
+        </p:txBody>
+      </p:sp>
+      <p:sp>
+        <p:nvSpPr>
+          <p:cNvPr id="231" name="ZoneTexte 230">
+            <a:extLst>
+              <a:ext uri="{FF2B5EF4-FFF2-40B4-BE49-F238E27FC236}">
+                <a16:creationId xmlns:a16="http://schemas.microsoft.com/office/drawing/2014/main" id="{75B93C20-2FF6-3E91-BB25-5E377C34F40E}"/>
+              </a:ext>
+            </a:extLst>
+          </p:cNvPr>
+          <p:cNvSpPr txBox="1"/>
+          <p:nvPr/>
+        </p:nvSpPr>
+        <p:spPr>
+          <a:xfrm>
+            <a:off x="800918" y="3335625"/>
+            <a:ext cx="546175" cy="276999"/>
+          </a:xfrm>
+          <a:prstGeom prst="rect">
+            <a:avLst/>
+          </a:prstGeom>
+          <a:noFill/>
+        </p:spPr>
+        <p:txBody>
+          <a:bodyPr wrap="none" rtlCol="0">
+            <a:spAutoFit/>
+          </a:bodyPr>
+          <a:lstStyle/>
+          <a:p>
+            <a:r>
+              <a:rPr lang="fr-FR" sz="1200" dirty="0"/>
+              <a:t>Rows</a:t>
+            </a:r>
+          </a:p>
+        </p:txBody>
+      </p:sp>
+    </p:spTree>
+    <p:extLst>
+      <p:ext uri="{BB962C8B-B14F-4D97-AF65-F5344CB8AC3E}">
+        <p14:creationId xmlns:p14="http://schemas.microsoft.com/office/powerpoint/2010/main" val="322820380"/>
       </p:ext>
     </p:extLst>
   </p:cSld>

</xml_diff>

<commit_message>
New image for opening and closing
</commit_message>
<xml_diff>
--- a/figures/figures.pptx
+++ b/figures/figures.pptx
@@ -7,6 +7,7 @@
   <p:sldIdLst>
     <p:sldId id="256" r:id="rId2"/>
     <p:sldId id="257" r:id="rId3"/>
+    <p:sldId id="258" r:id="rId4"/>
   </p:sldIdLst>
   <p:sldSz cx="12192000" cy="6858000"/>
   <p:notesSz cx="6858000" cy="9144000"/>
@@ -260,7 +261,7 @@
           <a:p>
             <a:fld id="{BA1467D7-2E6A-4A59-A316-2641B7B70597}" type="datetimeFigureOut">
               <a:rPr lang="fr-FR" smtClean="0"/>
-              <a:t>23/08/2024</a:t>
+              <a:t>24/08/2024</a:t>
             </a:fld>
             <a:endParaRPr lang="fr-FR"/>
           </a:p>
@@ -458,7 +459,7 @@
           <a:p>
             <a:fld id="{BA1467D7-2E6A-4A59-A316-2641B7B70597}" type="datetimeFigureOut">
               <a:rPr lang="fr-FR" smtClean="0"/>
-              <a:t>23/08/2024</a:t>
+              <a:t>24/08/2024</a:t>
             </a:fld>
             <a:endParaRPr lang="fr-FR"/>
           </a:p>
@@ -666,7 +667,7 @@
           <a:p>
             <a:fld id="{BA1467D7-2E6A-4A59-A316-2641B7B70597}" type="datetimeFigureOut">
               <a:rPr lang="fr-FR" smtClean="0"/>
-              <a:t>23/08/2024</a:t>
+              <a:t>24/08/2024</a:t>
             </a:fld>
             <a:endParaRPr lang="fr-FR"/>
           </a:p>
@@ -864,7 +865,7 @@
           <a:p>
             <a:fld id="{BA1467D7-2E6A-4A59-A316-2641B7B70597}" type="datetimeFigureOut">
               <a:rPr lang="fr-FR" smtClean="0"/>
-              <a:t>23/08/2024</a:t>
+              <a:t>24/08/2024</a:t>
             </a:fld>
             <a:endParaRPr lang="fr-FR"/>
           </a:p>
@@ -1139,7 +1140,7 @@
           <a:p>
             <a:fld id="{BA1467D7-2E6A-4A59-A316-2641B7B70597}" type="datetimeFigureOut">
               <a:rPr lang="fr-FR" smtClean="0"/>
-              <a:t>23/08/2024</a:t>
+              <a:t>24/08/2024</a:t>
             </a:fld>
             <a:endParaRPr lang="fr-FR"/>
           </a:p>
@@ -1404,7 +1405,7 @@
           <a:p>
             <a:fld id="{BA1467D7-2E6A-4A59-A316-2641B7B70597}" type="datetimeFigureOut">
               <a:rPr lang="fr-FR" smtClean="0"/>
-              <a:t>23/08/2024</a:t>
+              <a:t>24/08/2024</a:t>
             </a:fld>
             <a:endParaRPr lang="fr-FR"/>
           </a:p>
@@ -1816,7 +1817,7 @@
           <a:p>
             <a:fld id="{BA1467D7-2E6A-4A59-A316-2641B7B70597}" type="datetimeFigureOut">
               <a:rPr lang="fr-FR" smtClean="0"/>
-              <a:t>23/08/2024</a:t>
+              <a:t>24/08/2024</a:t>
             </a:fld>
             <a:endParaRPr lang="fr-FR"/>
           </a:p>
@@ -1957,7 +1958,7 @@
           <a:p>
             <a:fld id="{BA1467D7-2E6A-4A59-A316-2641B7B70597}" type="datetimeFigureOut">
               <a:rPr lang="fr-FR" smtClean="0"/>
-              <a:t>23/08/2024</a:t>
+              <a:t>24/08/2024</a:t>
             </a:fld>
             <a:endParaRPr lang="fr-FR"/>
           </a:p>
@@ -2070,7 +2071,7 @@
           <a:p>
             <a:fld id="{BA1467D7-2E6A-4A59-A316-2641B7B70597}" type="datetimeFigureOut">
               <a:rPr lang="fr-FR" smtClean="0"/>
-              <a:t>23/08/2024</a:t>
+              <a:t>24/08/2024</a:t>
             </a:fld>
             <a:endParaRPr lang="fr-FR"/>
           </a:p>
@@ -2381,7 +2382,7 @@
           <a:p>
             <a:fld id="{BA1467D7-2E6A-4A59-A316-2641B7B70597}" type="datetimeFigureOut">
               <a:rPr lang="fr-FR" smtClean="0"/>
-              <a:t>23/08/2024</a:t>
+              <a:t>24/08/2024</a:t>
             </a:fld>
             <a:endParaRPr lang="fr-FR"/>
           </a:p>
@@ -2669,7 +2670,7 @@
           <a:p>
             <a:fld id="{BA1467D7-2E6A-4A59-A316-2641B7B70597}" type="datetimeFigureOut">
               <a:rPr lang="fr-FR" smtClean="0"/>
-              <a:t>23/08/2024</a:t>
+              <a:t>24/08/2024</a:t>
             </a:fld>
             <a:endParaRPr lang="fr-FR"/>
           </a:p>
@@ -2910,7 +2911,7 @@
           <a:p>
             <a:fld id="{BA1467D7-2E6A-4A59-A316-2641B7B70597}" type="datetimeFigureOut">
               <a:rPr lang="fr-FR" smtClean="0"/>
-              <a:t>23/08/2024</a:t>
+              <a:t>24/08/2024</a:t>
             </a:fld>
             <a:endParaRPr lang="fr-FR"/>
           </a:p>
@@ -17735,6 +17736,934 @@
     <p:extLst>
       <p:ext uri="{BB962C8B-B14F-4D97-AF65-F5344CB8AC3E}">
         <p14:creationId xmlns:p14="http://schemas.microsoft.com/office/powerpoint/2010/main" val="322820380"/>
+      </p:ext>
+    </p:extLst>
+  </p:cSld>
+  <p:clrMapOvr>
+    <a:masterClrMapping/>
+  </p:clrMapOvr>
+</p:sld>
+</file>
+
+<file path=ppt/slides/slide3.xml><?xml version="1.0" encoding="utf-8"?>
+<p:sld xmlns:a="http://schemas.openxmlformats.org/drawingml/2006/main" xmlns:r="http://schemas.openxmlformats.org/officeDocument/2006/relationships" xmlns:p="http://schemas.openxmlformats.org/presentationml/2006/main">
+  <p:cSld>
+    <p:spTree>
+      <p:nvGrpSpPr>
+        <p:cNvPr id="1" name=""/>
+        <p:cNvGrpSpPr/>
+        <p:nvPr/>
+      </p:nvGrpSpPr>
+      <p:grpSpPr>
+        <a:xfrm>
+          <a:off x="0" y="0"/>
+          <a:ext cx="0" cy="0"/>
+          <a:chOff x="0" y="0"/>
+          <a:chExt cx="0" cy="0"/>
+        </a:xfrm>
+      </p:grpSpPr>
+      <p:sp>
+        <p:nvSpPr>
+          <p:cNvPr id="229" name="ZoneTexte 228">
+            <a:extLst>
+              <a:ext uri="{FF2B5EF4-FFF2-40B4-BE49-F238E27FC236}">
+                <a16:creationId xmlns:a16="http://schemas.microsoft.com/office/drawing/2014/main" id="{CDF08BE9-BEC6-F424-F063-6BF6035CA374}"/>
+              </a:ext>
+            </a:extLst>
+          </p:cNvPr>
+          <p:cNvSpPr txBox="1"/>
+          <p:nvPr/>
+        </p:nvSpPr>
+        <p:spPr>
+          <a:xfrm>
+            <a:off x="618019" y="438284"/>
+            <a:ext cx="2571538" cy="369332"/>
+          </a:xfrm>
+          <a:prstGeom prst="rect">
+            <a:avLst/>
+          </a:prstGeom>
+          <a:noFill/>
+        </p:spPr>
+        <p:txBody>
+          <a:bodyPr wrap="none" rtlCol="0">
+            <a:spAutoFit/>
+          </a:bodyPr>
+          <a:lstStyle/>
+          <a:p>
+            <a:r>
+              <a:rPr lang="fr-FR" dirty="0" err="1"/>
+              <a:t>Opening</a:t>
+            </a:r>
+            <a:r>
+              <a:rPr lang="fr-FR" dirty="0"/>
+              <a:t>/</a:t>
+            </a:r>
+            <a:r>
+              <a:rPr lang="fr-FR" dirty="0" err="1"/>
+              <a:t>Closing</a:t>
+            </a:r>
+            <a:r>
+              <a:rPr lang="fr-FR" dirty="0"/>
+              <a:t> figures</a:t>
+            </a:r>
+          </a:p>
+        </p:txBody>
+      </p:sp>
+      <p:sp>
+        <p:nvSpPr>
+          <p:cNvPr id="345" name="Rectangle 344">
+            <a:extLst>
+              <a:ext uri="{FF2B5EF4-FFF2-40B4-BE49-F238E27FC236}">
+                <a16:creationId xmlns:a16="http://schemas.microsoft.com/office/drawing/2014/main" id="{CFE3CA0F-12F0-81BB-3C3E-1E086CBE22DB}"/>
+              </a:ext>
+            </a:extLst>
+          </p:cNvPr>
+          <p:cNvSpPr/>
+          <p:nvPr/>
+        </p:nvSpPr>
+        <p:spPr>
+          <a:xfrm>
+            <a:off x="4747683" y="807616"/>
+            <a:ext cx="5400000" cy="5400000"/>
+          </a:xfrm>
+          <a:prstGeom prst="rect">
+            <a:avLst/>
+          </a:prstGeom>
+          <a:solidFill>
+            <a:schemeClr val="tx1"/>
+          </a:solidFill>
+          <a:ln w="76200">
+            <a:solidFill>
+              <a:schemeClr val="tx1"/>
+            </a:solidFill>
+          </a:ln>
+        </p:spPr>
+        <p:style>
+          <a:lnRef idx="2">
+            <a:schemeClr val="accent1">
+              <a:shade val="15000"/>
+            </a:schemeClr>
+          </a:lnRef>
+          <a:fillRef idx="1">
+            <a:schemeClr val="accent1"/>
+          </a:fillRef>
+          <a:effectRef idx="0">
+            <a:schemeClr val="accent1"/>
+          </a:effectRef>
+          <a:fontRef idx="minor">
+            <a:schemeClr val="lt1"/>
+          </a:fontRef>
+        </p:style>
+        <p:txBody>
+          <a:bodyPr rtlCol="0" anchor="ctr"/>
+          <a:lstStyle/>
+          <a:p>
+            <a:pPr algn="ctr"/>
+            <a:endParaRPr lang="fr-FR" dirty="0">
+              <a:solidFill>
+                <a:schemeClr val="tx1"/>
+              </a:solidFill>
+            </a:endParaRPr>
+          </a:p>
+        </p:txBody>
+      </p:sp>
+      <p:sp>
+        <p:nvSpPr>
+          <p:cNvPr id="4" name="Cadre 3">
+            <a:extLst>
+              <a:ext uri="{FF2B5EF4-FFF2-40B4-BE49-F238E27FC236}">
+                <a16:creationId xmlns:a16="http://schemas.microsoft.com/office/drawing/2014/main" id="{B3ACF12B-7DDD-6880-144C-7093B4CF3FB2}"/>
+              </a:ext>
+            </a:extLst>
+          </p:cNvPr>
+          <p:cNvSpPr/>
+          <p:nvPr/>
+        </p:nvSpPr>
+        <p:spPr>
+          <a:xfrm>
+            <a:off x="5436524" y="1546167"/>
+            <a:ext cx="1645920" cy="931026"/>
+          </a:xfrm>
+          <a:prstGeom prst="frame">
+            <a:avLst>
+              <a:gd name="adj1" fmla="val 4315"/>
+            </a:avLst>
+          </a:prstGeom>
+          <a:solidFill>
+            <a:schemeClr val="bg1"/>
+          </a:solidFill>
+          <a:ln>
+            <a:noFill/>
+          </a:ln>
+        </p:spPr>
+        <p:style>
+          <a:lnRef idx="2">
+            <a:schemeClr val="accent1">
+              <a:shade val="15000"/>
+            </a:schemeClr>
+          </a:lnRef>
+          <a:fillRef idx="1">
+            <a:schemeClr val="accent1"/>
+          </a:fillRef>
+          <a:effectRef idx="0">
+            <a:schemeClr val="accent1"/>
+          </a:effectRef>
+          <a:fontRef idx="minor">
+            <a:schemeClr val="lt1"/>
+          </a:fontRef>
+        </p:style>
+        <p:txBody>
+          <a:bodyPr rtlCol="0" anchor="ctr"/>
+          <a:lstStyle/>
+          <a:p>
+            <a:pPr algn="ctr"/>
+            <a:endParaRPr lang="fr-FR">
+              <a:solidFill>
+                <a:schemeClr val="tx1"/>
+              </a:solidFill>
+            </a:endParaRPr>
+          </a:p>
+        </p:txBody>
+      </p:sp>
+      <p:sp>
+        <p:nvSpPr>
+          <p:cNvPr id="5" name="Cadre 4">
+            <a:extLst>
+              <a:ext uri="{FF2B5EF4-FFF2-40B4-BE49-F238E27FC236}">
+                <a16:creationId xmlns:a16="http://schemas.microsoft.com/office/drawing/2014/main" id="{7701899D-1460-D42A-83FB-3C9651D4A275}"/>
+              </a:ext>
+            </a:extLst>
+          </p:cNvPr>
+          <p:cNvSpPr/>
+          <p:nvPr/>
+        </p:nvSpPr>
+        <p:spPr>
+          <a:xfrm>
+            <a:off x="5731972" y="1714153"/>
+            <a:ext cx="1055024" cy="595053"/>
+          </a:xfrm>
+          <a:prstGeom prst="frame">
+            <a:avLst>
+              <a:gd name="adj1" fmla="val 18401"/>
+            </a:avLst>
+          </a:prstGeom>
+          <a:solidFill>
+            <a:schemeClr val="bg1"/>
+          </a:solidFill>
+          <a:ln>
+            <a:noFill/>
+          </a:ln>
+        </p:spPr>
+        <p:style>
+          <a:lnRef idx="2">
+            <a:schemeClr val="accent1">
+              <a:shade val="15000"/>
+            </a:schemeClr>
+          </a:lnRef>
+          <a:fillRef idx="1">
+            <a:schemeClr val="accent1"/>
+          </a:fillRef>
+          <a:effectRef idx="0">
+            <a:schemeClr val="accent1"/>
+          </a:effectRef>
+          <a:fontRef idx="minor">
+            <a:schemeClr val="lt1"/>
+          </a:fontRef>
+        </p:style>
+        <p:txBody>
+          <a:bodyPr rtlCol="0" anchor="ctr"/>
+          <a:lstStyle/>
+          <a:p>
+            <a:pPr algn="ctr"/>
+            <a:endParaRPr lang="fr-FR">
+              <a:solidFill>
+                <a:schemeClr val="tx1"/>
+              </a:solidFill>
+            </a:endParaRPr>
+          </a:p>
+        </p:txBody>
+      </p:sp>
+      <p:sp>
+        <p:nvSpPr>
+          <p:cNvPr id="6" name="Cadre 5">
+            <a:extLst>
+              <a:ext uri="{FF2B5EF4-FFF2-40B4-BE49-F238E27FC236}">
+                <a16:creationId xmlns:a16="http://schemas.microsoft.com/office/drawing/2014/main" id="{DB90D1CC-2247-08C5-981D-EA1DC2F4E2BE}"/>
+              </a:ext>
+            </a:extLst>
+          </p:cNvPr>
+          <p:cNvSpPr/>
+          <p:nvPr/>
+        </p:nvSpPr>
+        <p:spPr>
+          <a:xfrm>
+            <a:off x="6029152" y="1905051"/>
+            <a:ext cx="460664" cy="213256"/>
+          </a:xfrm>
+          <a:prstGeom prst="frame">
+            <a:avLst>
+              <a:gd name="adj1" fmla="val 29120"/>
+            </a:avLst>
+          </a:prstGeom>
+          <a:solidFill>
+            <a:schemeClr val="bg1"/>
+          </a:solidFill>
+          <a:ln>
+            <a:noFill/>
+          </a:ln>
+        </p:spPr>
+        <p:style>
+          <a:lnRef idx="2">
+            <a:schemeClr val="accent1">
+              <a:shade val="15000"/>
+            </a:schemeClr>
+          </a:lnRef>
+          <a:fillRef idx="1">
+            <a:schemeClr val="accent1"/>
+          </a:fillRef>
+          <a:effectRef idx="0">
+            <a:schemeClr val="accent1"/>
+          </a:effectRef>
+          <a:fontRef idx="minor">
+            <a:schemeClr val="lt1"/>
+          </a:fontRef>
+        </p:style>
+        <p:txBody>
+          <a:bodyPr rtlCol="0" anchor="ctr"/>
+          <a:lstStyle/>
+          <a:p>
+            <a:pPr algn="ctr"/>
+            <a:endParaRPr lang="fr-FR">
+              <a:solidFill>
+                <a:schemeClr val="tx1"/>
+              </a:solidFill>
+            </a:endParaRPr>
+          </a:p>
+        </p:txBody>
+      </p:sp>
+      <p:sp>
+        <p:nvSpPr>
+          <p:cNvPr id="7" name="Demi-cadre 6">
+            <a:extLst>
+              <a:ext uri="{FF2B5EF4-FFF2-40B4-BE49-F238E27FC236}">
+                <a16:creationId xmlns:a16="http://schemas.microsoft.com/office/drawing/2014/main" id="{9E8CABBF-53E3-9386-3160-1E084824C5E0}"/>
+              </a:ext>
+            </a:extLst>
+          </p:cNvPr>
+          <p:cNvSpPr/>
+          <p:nvPr/>
+        </p:nvSpPr>
+        <p:spPr>
+          <a:xfrm>
+            <a:off x="5436524" y="3260569"/>
+            <a:ext cx="1645920" cy="1698171"/>
+          </a:xfrm>
+          <a:prstGeom prst="halfFrame">
+            <a:avLst>
+              <a:gd name="adj1" fmla="val 13064"/>
+              <a:gd name="adj2" fmla="val 14029"/>
+            </a:avLst>
+          </a:prstGeom>
+          <a:solidFill>
+            <a:schemeClr val="bg1"/>
+          </a:solidFill>
+          <a:ln>
+            <a:noFill/>
+          </a:ln>
+        </p:spPr>
+        <p:style>
+          <a:lnRef idx="2">
+            <a:schemeClr val="accent1">
+              <a:shade val="15000"/>
+            </a:schemeClr>
+          </a:lnRef>
+          <a:fillRef idx="1">
+            <a:schemeClr val="accent1"/>
+          </a:fillRef>
+          <a:effectRef idx="0">
+            <a:schemeClr val="accent1"/>
+          </a:effectRef>
+          <a:fontRef idx="minor">
+            <a:schemeClr val="lt1"/>
+          </a:fontRef>
+        </p:style>
+        <p:txBody>
+          <a:bodyPr rtlCol="0" anchor="ctr"/>
+          <a:lstStyle/>
+          <a:p>
+            <a:pPr algn="ctr"/>
+            <a:endParaRPr lang="fr-FR">
+              <a:solidFill>
+                <a:schemeClr val="tx1"/>
+              </a:solidFill>
+            </a:endParaRPr>
+          </a:p>
+        </p:txBody>
+      </p:sp>
+      <p:sp>
+        <p:nvSpPr>
+          <p:cNvPr id="8" name="Demi-cadre 7">
+            <a:extLst>
+              <a:ext uri="{FF2B5EF4-FFF2-40B4-BE49-F238E27FC236}">
+                <a16:creationId xmlns:a16="http://schemas.microsoft.com/office/drawing/2014/main" id="{3CBE4D3C-D03B-EE12-7FA3-BA346C634BAE}"/>
+              </a:ext>
+            </a:extLst>
+          </p:cNvPr>
+          <p:cNvSpPr/>
+          <p:nvPr/>
+        </p:nvSpPr>
+        <p:spPr>
+          <a:xfrm>
+            <a:off x="5855664" y="3613663"/>
+            <a:ext cx="931332" cy="943824"/>
+          </a:xfrm>
+          <a:prstGeom prst="halfFrame">
+            <a:avLst>
+              <a:gd name="adj1" fmla="val 13064"/>
+              <a:gd name="adj2" fmla="val 14029"/>
+            </a:avLst>
+          </a:prstGeom>
+          <a:solidFill>
+            <a:schemeClr val="bg1"/>
+          </a:solidFill>
+          <a:ln>
+            <a:noFill/>
+          </a:ln>
+        </p:spPr>
+        <p:style>
+          <a:lnRef idx="2">
+            <a:schemeClr val="accent1">
+              <a:shade val="15000"/>
+            </a:schemeClr>
+          </a:lnRef>
+          <a:fillRef idx="1">
+            <a:schemeClr val="accent1"/>
+          </a:fillRef>
+          <a:effectRef idx="0">
+            <a:schemeClr val="accent1"/>
+          </a:effectRef>
+          <a:fontRef idx="minor">
+            <a:schemeClr val="lt1"/>
+          </a:fontRef>
+        </p:style>
+        <p:txBody>
+          <a:bodyPr rtlCol="0" anchor="ctr"/>
+          <a:lstStyle/>
+          <a:p>
+            <a:pPr algn="ctr"/>
+            <a:endParaRPr lang="fr-FR">
+              <a:solidFill>
+                <a:schemeClr val="tx1"/>
+              </a:solidFill>
+            </a:endParaRPr>
+          </a:p>
+        </p:txBody>
+      </p:sp>
+      <p:sp>
+        <p:nvSpPr>
+          <p:cNvPr id="9" name="Demi-cadre 8">
+            <a:extLst>
+              <a:ext uri="{FF2B5EF4-FFF2-40B4-BE49-F238E27FC236}">
+                <a16:creationId xmlns:a16="http://schemas.microsoft.com/office/drawing/2014/main" id="{0C489FA8-C22A-D2DF-B8A6-FF80FBE62C00}"/>
+              </a:ext>
+            </a:extLst>
+          </p:cNvPr>
+          <p:cNvSpPr/>
+          <p:nvPr/>
+        </p:nvSpPr>
+        <p:spPr>
+          <a:xfrm>
+            <a:off x="6096000" y="3814290"/>
+            <a:ext cx="522514" cy="510967"/>
+          </a:xfrm>
+          <a:prstGeom prst="halfFrame">
+            <a:avLst>
+              <a:gd name="adj1" fmla="val 13064"/>
+              <a:gd name="adj2" fmla="val 14029"/>
+            </a:avLst>
+          </a:prstGeom>
+          <a:solidFill>
+            <a:schemeClr val="bg1"/>
+          </a:solidFill>
+          <a:ln>
+            <a:noFill/>
+          </a:ln>
+        </p:spPr>
+        <p:style>
+          <a:lnRef idx="2">
+            <a:schemeClr val="accent1">
+              <a:shade val="15000"/>
+            </a:schemeClr>
+          </a:lnRef>
+          <a:fillRef idx="1">
+            <a:schemeClr val="accent1"/>
+          </a:fillRef>
+          <a:effectRef idx="0">
+            <a:schemeClr val="accent1"/>
+          </a:effectRef>
+          <a:fontRef idx="minor">
+            <a:schemeClr val="lt1"/>
+          </a:fontRef>
+        </p:style>
+        <p:txBody>
+          <a:bodyPr rtlCol="0" anchor="ctr"/>
+          <a:lstStyle/>
+          <a:p>
+            <a:pPr algn="ctr"/>
+            <a:endParaRPr lang="fr-FR">
+              <a:solidFill>
+                <a:schemeClr val="tx1"/>
+              </a:solidFill>
+            </a:endParaRPr>
+          </a:p>
+        </p:txBody>
+      </p:sp>
+      <p:sp>
+        <p:nvSpPr>
+          <p:cNvPr id="10" name="Cercle : creux 9">
+            <a:extLst>
+              <a:ext uri="{FF2B5EF4-FFF2-40B4-BE49-F238E27FC236}">
+                <a16:creationId xmlns:a16="http://schemas.microsoft.com/office/drawing/2014/main" id="{4A58F9A3-41DC-20B5-0295-98E16A93B10E}"/>
+              </a:ext>
+            </a:extLst>
+          </p:cNvPr>
+          <p:cNvSpPr/>
+          <p:nvPr/>
+        </p:nvSpPr>
+        <p:spPr>
+          <a:xfrm>
+            <a:off x="7609095" y="3976520"/>
+            <a:ext cx="1645920" cy="1698171"/>
+          </a:xfrm>
+          <a:prstGeom prst="donut">
+            <a:avLst>
+              <a:gd name="adj" fmla="val 9391"/>
+            </a:avLst>
+          </a:prstGeom>
+          <a:solidFill>
+            <a:schemeClr val="bg1"/>
+          </a:solidFill>
+          <a:ln>
+            <a:noFill/>
+          </a:ln>
+        </p:spPr>
+        <p:style>
+          <a:lnRef idx="2">
+            <a:schemeClr val="accent1">
+              <a:shade val="15000"/>
+            </a:schemeClr>
+          </a:lnRef>
+          <a:fillRef idx="1">
+            <a:schemeClr val="accent1"/>
+          </a:fillRef>
+          <a:effectRef idx="0">
+            <a:schemeClr val="accent1"/>
+          </a:effectRef>
+          <a:fontRef idx="minor">
+            <a:schemeClr val="lt1"/>
+          </a:fontRef>
+        </p:style>
+        <p:txBody>
+          <a:bodyPr rtlCol="0" anchor="ctr"/>
+          <a:lstStyle/>
+          <a:p>
+            <a:pPr algn="ctr"/>
+            <a:endParaRPr lang="fr-FR">
+              <a:solidFill>
+                <a:schemeClr val="tx1"/>
+              </a:solidFill>
+            </a:endParaRPr>
+          </a:p>
+        </p:txBody>
+      </p:sp>
+      <p:sp>
+        <p:nvSpPr>
+          <p:cNvPr id="11" name="Cercle : creux 10">
+            <a:extLst>
+              <a:ext uri="{FF2B5EF4-FFF2-40B4-BE49-F238E27FC236}">
+                <a16:creationId xmlns:a16="http://schemas.microsoft.com/office/drawing/2014/main" id="{A3F9DB07-1AA4-E78B-1E5D-0BF7F23DA69C}"/>
+              </a:ext>
+            </a:extLst>
+          </p:cNvPr>
+          <p:cNvSpPr/>
+          <p:nvPr/>
+        </p:nvSpPr>
+        <p:spPr>
+          <a:xfrm>
+            <a:off x="7992517" y="4391429"/>
+            <a:ext cx="879075" cy="868351"/>
+          </a:xfrm>
+          <a:prstGeom prst="donut">
+            <a:avLst>
+              <a:gd name="adj" fmla="val 9391"/>
+            </a:avLst>
+          </a:prstGeom>
+          <a:solidFill>
+            <a:schemeClr val="bg1"/>
+          </a:solidFill>
+          <a:ln>
+            <a:noFill/>
+          </a:ln>
+        </p:spPr>
+        <p:style>
+          <a:lnRef idx="2">
+            <a:schemeClr val="accent1">
+              <a:shade val="15000"/>
+            </a:schemeClr>
+          </a:lnRef>
+          <a:fillRef idx="1">
+            <a:schemeClr val="accent1"/>
+          </a:fillRef>
+          <a:effectRef idx="0">
+            <a:schemeClr val="accent1"/>
+          </a:effectRef>
+          <a:fontRef idx="minor">
+            <a:schemeClr val="lt1"/>
+          </a:fontRef>
+        </p:style>
+        <p:txBody>
+          <a:bodyPr rtlCol="0" anchor="ctr"/>
+          <a:lstStyle/>
+          <a:p>
+            <a:pPr algn="ctr"/>
+            <a:endParaRPr lang="fr-FR">
+              <a:solidFill>
+                <a:schemeClr val="tx1"/>
+              </a:solidFill>
+            </a:endParaRPr>
+          </a:p>
+        </p:txBody>
+      </p:sp>
+      <p:sp>
+        <p:nvSpPr>
+          <p:cNvPr id="12" name="Cercle : creux 11">
+            <a:extLst>
+              <a:ext uri="{FF2B5EF4-FFF2-40B4-BE49-F238E27FC236}">
+                <a16:creationId xmlns:a16="http://schemas.microsoft.com/office/drawing/2014/main" id="{DA6BA9A7-1D90-870B-BF9E-0AD53A22604E}"/>
+              </a:ext>
+            </a:extLst>
+          </p:cNvPr>
+          <p:cNvSpPr/>
+          <p:nvPr/>
+        </p:nvSpPr>
+        <p:spPr>
+          <a:xfrm>
+            <a:off x="6376318" y="5259780"/>
+            <a:ext cx="566614" cy="532923"/>
+          </a:xfrm>
+          <a:prstGeom prst="donut">
+            <a:avLst>
+              <a:gd name="adj" fmla="val 9391"/>
+            </a:avLst>
+          </a:prstGeom>
+          <a:solidFill>
+            <a:schemeClr val="bg1"/>
+          </a:solidFill>
+          <a:ln>
+            <a:noFill/>
+          </a:ln>
+        </p:spPr>
+        <p:style>
+          <a:lnRef idx="2">
+            <a:schemeClr val="accent1">
+              <a:shade val="15000"/>
+            </a:schemeClr>
+          </a:lnRef>
+          <a:fillRef idx="1">
+            <a:schemeClr val="accent1"/>
+          </a:fillRef>
+          <a:effectRef idx="0">
+            <a:schemeClr val="accent1"/>
+          </a:effectRef>
+          <a:fontRef idx="minor">
+            <a:schemeClr val="lt1"/>
+          </a:fontRef>
+        </p:style>
+        <p:txBody>
+          <a:bodyPr rtlCol="0" anchor="ctr"/>
+          <a:lstStyle/>
+          <a:p>
+            <a:pPr algn="ctr"/>
+            <a:endParaRPr lang="fr-FR">
+              <a:solidFill>
+                <a:schemeClr val="tx1"/>
+              </a:solidFill>
+            </a:endParaRPr>
+          </a:p>
+        </p:txBody>
+      </p:sp>
+      <p:sp>
+        <p:nvSpPr>
+          <p:cNvPr id="13" name="Rectangle 12">
+            <a:extLst>
+              <a:ext uri="{FF2B5EF4-FFF2-40B4-BE49-F238E27FC236}">
+                <a16:creationId xmlns:a16="http://schemas.microsoft.com/office/drawing/2014/main" id="{FAF6305C-5C07-BAFE-85B3-395E2C46EED6}"/>
+              </a:ext>
+            </a:extLst>
+          </p:cNvPr>
+          <p:cNvSpPr/>
+          <p:nvPr/>
+        </p:nvSpPr>
+        <p:spPr>
+          <a:xfrm>
+            <a:off x="8136193" y="1661107"/>
+            <a:ext cx="1470797" cy="701143"/>
+          </a:xfrm>
+          <a:prstGeom prst="rect">
+            <a:avLst/>
+          </a:prstGeom>
+          <a:solidFill>
+            <a:schemeClr val="bg1"/>
+          </a:solidFill>
+          <a:ln>
+            <a:noFill/>
+          </a:ln>
+        </p:spPr>
+        <p:style>
+          <a:lnRef idx="2">
+            <a:schemeClr val="accent1">
+              <a:shade val="15000"/>
+            </a:schemeClr>
+          </a:lnRef>
+          <a:fillRef idx="1">
+            <a:schemeClr val="accent1"/>
+          </a:fillRef>
+          <a:effectRef idx="0">
+            <a:schemeClr val="accent1"/>
+          </a:effectRef>
+          <a:fontRef idx="minor">
+            <a:schemeClr val="lt1"/>
+          </a:fontRef>
+        </p:style>
+        <p:txBody>
+          <a:bodyPr rtlCol="0" anchor="ctr"/>
+          <a:lstStyle/>
+          <a:p>
+            <a:pPr algn="ctr"/>
+            <a:endParaRPr lang="fr-FR"/>
+          </a:p>
+        </p:txBody>
+      </p:sp>
+      <p:sp>
+        <p:nvSpPr>
+          <p:cNvPr id="15" name="Croix 14">
+            <a:extLst>
+              <a:ext uri="{FF2B5EF4-FFF2-40B4-BE49-F238E27FC236}">
+                <a16:creationId xmlns:a16="http://schemas.microsoft.com/office/drawing/2014/main" id="{AD55F60D-F405-25EB-39FF-3764F5FC3068}"/>
+              </a:ext>
+            </a:extLst>
+          </p:cNvPr>
+          <p:cNvSpPr/>
+          <p:nvPr/>
+        </p:nvSpPr>
+        <p:spPr>
+          <a:xfrm>
+            <a:off x="8226230" y="1805870"/>
+            <a:ext cx="411647" cy="411615"/>
+          </a:xfrm>
+          <a:prstGeom prst="plus">
+            <a:avLst>
+              <a:gd name="adj" fmla="val 44640"/>
+            </a:avLst>
+          </a:prstGeom>
+          <a:solidFill>
+            <a:schemeClr val="tx1"/>
+          </a:solidFill>
+          <a:ln>
+            <a:noFill/>
+          </a:ln>
+        </p:spPr>
+        <p:style>
+          <a:lnRef idx="2">
+            <a:schemeClr val="accent1">
+              <a:shade val="15000"/>
+            </a:schemeClr>
+          </a:lnRef>
+          <a:fillRef idx="1">
+            <a:schemeClr val="accent1"/>
+          </a:fillRef>
+          <a:effectRef idx="0">
+            <a:schemeClr val="accent1"/>
+          </a:effectRef>
+          <a:fontRef idx="minor">
+            <a:schemeClr val="lt1"/>
+          </a:fontRef>
+        </p:style>
+        <p:txBody>
+          <a:bodyPr rtlCol="0" anchor="ctr"/>
+          <a:lstStyle/>
+          <a:p>
+            <a:pPr algn="ctr"/>
+            <a:endParaRPr lang="fr-FR"/>
+          </a:p>
+        </p:txBody>
+      </p:sp>
+      <p:sp>
+        <p:nvSpPr>
+          <p:cNvPr id="16" name="Croix 15">
+            <a:extLst>
+              <a:ext uri="{FF2B5EF4-FFF2-40B4-BE49-F238E27FC236}">
+                <a16:creationId xmlns:a16="http://schemas.microsoft.com/office/drawing/2014/main" id="{5655653C-7E01-1A06-17C7-38C9B8AB1C40}"/>
+              </a:ext>
+            </a:extLst>
+          </p:cNvPr>
+          <p:cNvSpPr/>
+          <p:nvPr/>
+        </p:nvSpPr>
+        <p:spPr>
+          <a:xfrm>
+            <a:off x="9049191" y="1805869"/>
+            <a:ext cx="411647" cy="411615"/>
+          </a:xfrm>
+          <a:prstGeom prst="plus">
+            <a:avLst>
+              <a:gd name="adj" fmla="val 33070"/>
+            </a:avLst>
+          </a:prstGeom>
+          <a:solidFill>
+            <a:schemeClr val="tx1"/>
+          </a:solidFill>
+          <a:ln>
+            <a:noFill/>
+          </a:ln>
+        </p:spPr>
+        <p:style>
+          <a:lnRef idx="2">
+            <a:schemeClr val="accent1">
+              <a:shade val="15000"/>
+            </a:schemeClr>
+          </a:lnRef>
+          <a:fillRef idx="1">
+            <a:schemeClr val="accent1"/>
+          </a:fillRef>
+          <a:effectRef idx="0">
+            <a:schemeClr val="accent1"/>
+          </a:effectRef>
+          <a:fontRef idx="minor">
+            <a:schemeClr val="lt1"/>
+          </a:fontRef>
+        </p:style>
+        <p:txBody>
+          <a:bodyPr rtlCol="0" anchor="ctr"/>
+          <a:lstStyle/>
+          <a:p>
+            <a:pPr algn="ctr"/>
+            <a:endParaRPr lang="fr-FR"/>
+          </a:p>
+        </p:txBody>
+      </p:sp>
+      <p:sp>
+        <p:nvSpPr>
+          <p:cNvPr id="17" name="Croix 16">
+            <a:extLst>
+              <a:ext uri="{FF2B5EF4-FFF2-40B4-BE49-F238E27FC236}">
+                <a16:creationId xmlns:a16="http://schemas.microsoft.com/office/drawing/2014/main" id="{F010F595-3F01-46FB-B691-EA5288A615DF}"/>
+              </a:ext>
+            </a:extLst>
+          </p:cNvPr>
+          <p:cNvSpPr/>
+          <p:nvPr/>
+        </p:nvSpPr>
+        <p:spPr>
+          <a:xfrm>
+            <a:off x="8742276" y="2045736"/>
+            <a:ext cx="198481" cy="207708"/>
+          </a:xfrm>
+          <a:prstGeom prst="plus">
+            <a:avLst>
+              <a:gd name="adj" fmla="val 39469"/>
+            </a:avLst>
+          </a:prstGeom>
+          <a:solidFill>
+            <a:schemeClr val="tx1"/>
+          </a:solidFill>
+          <a:ln>
+            <a:noFill/>
+          </a:ln>
+        </p:spPr>
+        <p:style>
+          <a:lnRef idx="2">
+            <a:schemeClr val="accent1">
+              <a:shade val="15000"/>
+            </a:schemeClr>
+          </a:lnRef>
+          <a:fillRef idx="1">
+            <a:schemeClr val="accent1"/>
+          </a:fillRef>
+          <a:effectRef idx="0">
+            <a:schemeClr val="accent1"/>
+          </a:effectRef>
+          <a:fontRef idx="minor">
+            <a:schemeClr val="lt1"/>
+          </a:fontRef>
+        </p:style>
+        <p:txBody>
+          <a:bodyPr rtlCol="0" anchor="ctr"/>
+          <a:lstStyle/>
+          <a:p>
+            <a:pPr algn="ctr"/>
+            <a:endParaRPr lang="fr-FR"/>
+          </a:p>
+        </p:txBody>
+      </p:sp>
+      <p:sp>
+        <p:nvSpPr>
+          <p:cNvPr id="18" name="Croix 17">
+            <a:extLst>
+              <a:ext uri="{FF2B5EF4-FFF2-40B4-BE49-F238E27FC236}">
+                <a16:creationId xmlns:a16="http://schemas.microsoft.com/office/drawing/2014/main" id="{474063C2-A359-27DF-B258-AFEC91FE5B9C}"/>
+              </a:ext>
+            </a:extLst>
+          </p:cNvPr>
+          <p:cNvSpPr/>
+          <p:nvPr/>
+        </p:nvSpPr>
+        <p:spPr>
+          <a:xfrm>
+            <a:off x="8742276" y="1749568"/>
+            <a:ext cx="198481" cy="207708"/>
+          </a:xfrm>
+          <a:prstGeom prst="plus">
+            <a:avLst>
+              <a:gd name="adj" fmla="val 29871"/>
+            </a:avLst>
+          </a:prstGeom>
+          <a:solidFill>
+            <a:schemeClr val="tx1"/>
+          </a:solidFill>
+          <a:ln>
+            <a:noFill/>
+          </a:ln>
+        </p:spPr>
+        <p:style>
+          <a:lnRef idx="2">
+            <a:schemeClr val="accent1">
+              <a:shade val="15000"/>
+            </a:schemeClr>
+          </a:lnRef>
+          <a:fillRef idx="1">
+            <a:schemeClr val="accent1"/>
+          </a:fillRef>
+          <a:effectRef idx="0">
+            <a:schemeClr val="accent1"/>
+          </a:effectRef>
+          <a:fontRef idx="minor">
+            <a:schemeClr val="lt1"/>
+          </a:fontRef>
+        </p:style>
+        <p:txBody>
+          <a:bodyPr rtlCol="0" anchor="ctr"/>
+          <a:lstStyle/>
+          <a:p>
+            <a:pPr algn="ctr"/>
+            <a:endParaRPr lang="fr-FR"/>
+          </a:p>
+        </p:txBody>
+      </p:sp>
+    </p:spTree>
+    <p:extLst>
+      <p:ext uri="{BB962C8B-B14F-4D97-AF65-F5344CB8AC3E}">
+        <p14:creationId xmlns:p14="http://schemas.microsoft.com/office/powerpoint/2010/main" val="1477872293"/>
       </p:ext>
     </p:extLst>
   </p:cSld>

</xml_diff>